<commit_message>
dodanie admin views do prezki i raportu
</commit_message>
<xml_diff>
--- a/raport and prez/flixScrapper.pptx
+++ b/raport and prez/flixScrapper.pptx
@@ -109,6 +109,11 @@
       </a:defRPr>
     </a:lvl9pPr>
   </p:defaultTextStyle>
+  <p:extLst>
+    <p:ext uri="{EFAFB233-063F-42B5-8137-9DF3F51BA10A}">
+      <p15:sldGuideLst xmlns:p15="http://schemas.microsoft.com/office/powerpoint/2012/main"/>
+    </p:ext>
+  </p:extLst>
 </p:presentation>
 </file>
 
@@ -251,7 +256,7 @@
           <a:p>
             <a:fld id="{9F8FCAA1-25EA-4F81-99C1-CDD58C343FAD}" type="datetimeFigureOut">
               <a:rPr lang="en-US" smtClean="0"/>
-              <a:t>1/11/2020</a:t>
+              <a:t>1/14/2020</a:t>
             </a:fld>
             <a:endParaRPr lang="en-US"/>
           </a:p>
@@ -462,7 +467,7 @@
           <a:p>
             <a:fld id="{9F8FCAA1-25EA-4F81-99C1-CDD58C343FAD}" type="datetimeFigureOut">
               <a:rPr lang="en-US" smtClean="0"/>
-              <a:t>1/11/2020</a:t>
+              <a:t>1/14/2020</a:t>
             </a:fld>
             <a:endParaRPr lang="en-US"/>
           </a:p>
@@ -677,7 +682,7 @@
           <a:p>
             <a:fld id="{9F8FCAA1-25EA-4F81-99C1-CDD58C343FAD}" type="datetimeFigureOut">
               <a:rPr lang="en-US" smtClean="0"/>
-              <a:t>1/11/2020</a:t>
+              <a:t>1/14/2020</a:t>
             </a:fld>
             <a:endParaRPr lang="en-US"/>
           </a:p>
@@ -878,7 +883,7 @@
           <a:p>
             <a:fld id="{9F8FCAA1-25EA-4F81-99C1-CDD58C343FAD}" type="datetimeFigureOut">
               <a:rPr lang="en-US" smtClean="0"/>
-              <a:t>1/11/2020</a:t>
+              <a:t>1/14/2020</a:t>
             </a:fld>
             <a:endParaRPr lang="en-US"/>
           </a:p>
@@ -1157,7 +1162,7 @@
           <a:p>
             <a:fld id="{9F8FCAA1-25EA-4F81-99C1-CDD58C343FAD}" type="datetimeFigureOut">
               <a:rPr lang="en-US" smtClean="0"/>
-              <a:t>1/11/2020</a:t>
+              <a:t>1/14/2020</a:t>
             </a:fld>
             <a:endParaRPr lang="en-US"/>
           </a:p>
@@ -1425,7 +1430,7 @@
           <a:p>
             <a:fld id="{9F8FCAA1-25EA-4F81-99C1-CDD58C343FAD}" type="datetimeFigureOut">
               <a:rPr lang="en-US" smtClean="0"/>
-              <a:t>1/11/2020</a:t>
+              <a:t>1/14/2020</a:t>
             </a:fld>
             <a:endParaRPr lang="en-US"/>
           </a:p>
@@ -1841,7 +1846,7 @@
           <a:p>
             <a:fld id="{9F8FCAA1-25EA-4F81-99C1-CDD58C343FAD}" type="datetimeFigureOut">
               <a:rPr lang="en-US" smtClean="0"/>
-              <a:t>1/11/2020</a:t>
+              <a:t>1/14/2020</a:t>
             </a:fld>
             <a:endParaRPr lang="en-US"/>
           </a:p>
@@ -1990,7 +1995,7 @@
           <a:p>
             <a:fld id="{9F8FCAA1-25EA-4F81-99C1-CDD58C343FAD}" type="datetimeFigureOut">
               <a:rPr lang="en-US" smtClean="0"/>
-              <a:t>1/11/2020</a:t>
+              <a:t>1/14/2020</a:t>
             </a:fld>
             <a:endParaRPr lang="en-US"/>
           </a:p>
@@ -2116,7 +2121,7 @@
           <a:p>
             <a:fld id="{9F8FCAA1-25EA-4F81-99C1-CDD58C343FAD}" type="datetimeFigureOut">
               <a:rPr lang="en-US" smtClean="0"/>
-              <a:t>1/11/2020</a:t>
+              <a:t>1/14/2020</a:t>
             </a:fld>
             <a:endParaRPr lang="en-US"/>
           </a:p>
@@ -2367,7 +2372,7 @@
           <a:p>
             <a:fld id="{9F8FCAA1-25EA-4F81-99C1-CDD58C343FAD}" type="datetimeFigureOut">
               <a:rPr lang="en-US" smtClean="0"/>
-              <a:t>1/11/2020</a:t>
+              <a:t>1/14/2020</a:t>
             </a:fld>
             <a:endParaRPr lang="en-US"/>
           </a:p>
@@ -2812,7 +2817,7 @@
           <a:p>
             <a:fld id="{9F8FCAA1-25EA-4F81-99C1-CDD58C343FAD}" type="datetimeFigureOut">
               <a:rPr lang="en-US" smtClean="0"/>
-              <a:t>1/11/2020</a:t>
+              <a:t>1/14/2020</a:t>
             </a:fld>
             <a:endParaRPr lang="en-US"/>
           </a:p>
@@ -3139,7 +3144,7 @@
           <a:p>
             <a:fld id="{9F8FCAA1-25EA-4F81-99C1-CDD58C343FAD}" type="datetimeFigureOut">
               <a:rPr lang="en-US" smtClean="0"/>
-              <a:t>1/11/2020</a:t>
+              <a:t>1/14/2020</a:t>
             </a:fld>
             <a:endParaRPr lang="en-US"/>
           </a:p>
@@ -5455,6 +5460,34 @@
           </a:p>
         </p:txBody>
       </p:sp>
+      <p:pic>
+        <p:nvPicPr>
+          <p:cNvPr id="4" name="Obraz 3">
+            <a:extLst>
+              <a:ext uri="{FF2B5EF4-FFF2-40B4-BE49-F238E27FC236}">
+                <a16:creationId xmlns:a16="http://schemas.microsoft.com/office/drawing/2014/main" id="{8CC4D10B-D147-47BB-9535-6D68B834CCD1}"/>
+              </a:ext>
+            </a:extLst>
+          </p:cNvPr>
+          <p:cNvPicPr/>
+          <p:nvPr/>
+        </p:nvPicPr>
+        <p:blipFill>
+          <a:blip r:embed="rId2"/>
+          <a:stretch>
+            <a:fillRect/>
+          </a:stretch>
+        </p:blipFill>
+        <p:spPr>
+          <a:xfrm>
+            <a:off x="914400" y="1391654"/>
+            <a:ext cx="11041380" cy="5077725"/>
+          </a:xfrm>
+          <a:prstGeom prst="rect">
+            <a:avLst/>
+          </a:prstGeom>
+        </p:spPr>
+      </p:pic>
     </p:spTree>
     <p:extLst>
       <p:ext uri="{BB962C8B-B14F-4D97-AF65-F5344CB8AC3E}">

</xml_diff>